<commit_message>
Fri Jan 30 18:42:23 UTC 2009  James H. Hill  <hillj@isis.vanderbilt.edu>
git-svn-id: https://svn.cs.iupui.edu/repos/CUTS/trunk@2463 9fe22f9e-a3cf-4311-a215-5c011952144b
</commit_message>
<xml_diff>
--- a/CUTS/docs/manual/other/drawing-palette.pptx
+++ b/CUTS/docs/manual/other/drawing-palette.pptx
@@ -291,7 +291,7 @@
             <a:fld id="{B9524C96-D734-AD47-A187-46EFE930DBD0}" type="datetimeFigureOut">
               <a:rPr lang="en-US" smtClean="0"/>
               <a:pPr/>
-              <a:t>10/3/08</a:t>
+              <a:t>1/30/09</a:t>
             </a:fld>
             <a:endParaRPr lang="en-US"/>
           </a:p>
@@ -458,7 +458,7 @@
             <a:fld id="{B9524C96-D734-AD47-A187-46EFE930DBD0}" type="datetimeFigureOut">
               <a:rPr lang="en-US" smtClean="0"/>
               <a:pPr/>
-              <a:t>10/3/08</a:t>
+              <a:t>1/30/09</a:t>
             </a:fld>
             <a:endParaRPr lang="en-US"/>
           </a:p>
@@ -635,7 +635,7 @@
             <a:fld id="{B9524C96-D734-AD47-A187-46EFE930DBD0}" type="datetimeFigureOut">
               <a:rPr lang="en-US" smtClean="0"/>
               <a:pPr/>
-              <a:t>10/3/08</a:t>
+              <a:t>1/30/09</a:t>
             </a:fld>
             <a:endParaRPr lang="en-US"/>
           </a:p>
@@ -802,7 +802,7 @@
             <a:fld id="{B9524C96-D734-AD47-A187-46EFE930DBD0}" type="datetimeFigureOut">
               <a:rPr lang="en-US" smtClean="0"/>
               <a:pPr/>
-              <a:t>10/3/08</a:t>
+              <a:t>1/30/09</a:t>
             </a:fld>
             <a:endParaRPr lang="en-US"/>
           </a:p>
@@ -1045,7 +1045,7 @@
             <a:fld id="{B9524C96-D734-AD47-A187-46EFE930DBD0}" type="datetimeFigureOut">
               <a:rPr lang="en-US" smtClean="0"/>
               <a:pPr/>
-              <a:t>10/3/08</a:t>
+              <a:t>1/30/09</a:t>
             </a:fld>
             <a:endParaRPr lang="en-US"/>
           </a:p>
@@ -1330,7 +1330,7 @@
             <a:fld id="{B9524C96-D734-AD47-A187-46EFE930DBD0}" type="datetimeFigureOut">
               <a:rPr lang="en-US" smtClean="0"/>
               <a:pPr/>
-              <a:t>10/3/08</a:t>
+              <a:t>1/30/09</a:t>
             </a:fld>
             <a:endParaRPr lang="en-US"/>
           </a:p>
@@ -1749,7 +1749,7 @@
             <a:fld id="{B9524C96-D734-AD47-A187-46EFE930DBD0}" type="datetimeFigureOut">
               <a:rPr lang="en-US" smtClean="0"/>
               <a:pPr/>
-              <a:t>10/3/08</a:t>
+              <a:t>1/30/09</a:t>
             </a:fld>
             <a:endParaRPr lang="en-US"/>
           </a:p>
@@ -1864,7 +1864,7 @@
             <a:fld id="{B9524C96-D734-AD47-A187-46EFE930DBD0}" type="datetimeFigureOut">
               <a:rPr lang="en-US" smtClean="0"/>
               <a:pPr/>
-              <a:t>10/3/08</a:t>
+              <a:t>1/30/09</a:t>
             </a:fld>
             <a:endParaRPr lang="en-US"/>
           </a:p>
@@ -1956,7 +1956,7 @@
             <a:fld id="{B9524C96-D734-AD47-A187-46EFE930DBD0}" type="datetimeFigureOut">
               <a:rPr lang="en-US" smtClean="0"/>
               <a:pPr/>
-              <a:t>10/3/08</a:t>
+              <a:t>1/30/09</a:t>
             </a:fld>
             <a:endParaRPr lang="en-US"/>
           </a:p>
@@ -2230,7 +2230,7 @@
             <a:fld id="{B9524C96-D734-AD47-A187-46EFE930DBD0}" type="datetimeFigureOut">
               <a:rPr lang="en-US" smtClean="0"/>
               <a:pPr/>
-              <a:t>10/3/08</a:t>
+              <a:t>1/30/09</a:t>
             </a:fld>
             <a:endParaRPr lang="en-US"/>
           </a:p>
@@ -2480,7 +2480,7 @@
             <a:fld id="{B9524C96-D734-AD47-A187-46EFE930DBD0}" type="datetimeFigureOut">
               <a:rPr lang="en-US" smtClean="0"/>
               <a:pPr/>
-              <a:t>10/3/08</a:t>
+              <a:t>1/30/09</a:t>
             </a:fld>
             <a:endParaRPr lang="en-US"/>
           </a:p>
@@ -2690,7 +2690,7 @@
             <a:fld id="{B9524C96-D734-AD47-A187-46EFE930DBD0}" type="datetimeFigureOut">
               <a:rPr lang="en-US" smtClean="0"/>
               <a:pPr/>
-              <a:t>10/3/08</a:t>
+              <a:t>1/30/09</a:t>
             </a:fld>
             <a:endParaRPr lang="en-US"/>
           </a:p>
@@ -3069,7 +3069,7 @@
         </p:nvSpPr>
         <p:spPr>
           <a:xfrm>
-            <a:off x="762000" y="4038600"/>
+            <a:off x="533400" y="4114800"/>
             <a:ext cx="1371600" cy="685800"/>
           </a:xfrm>
           <a:prstGeom prst="cube">
@@ -3102,6 +3102,108 @@
                 </a:solidFill>
               </a:rPr>
               <a:t>ACE + TAO</a:t>
+            </a:r>
+            <a:endParaRPr lang="en-US" dirty="0">
+              <a:solidFill>
+                <a:srgbClr val="000000"/>
+              </a:solidFill>
+            </a:endParaRPr>
+          </a:p>
+        </p:txBody>
+      </p:sp>
+      <p:sp>
+        <p:nvSpPr>
+          <p:cNvPr id="9" name="Cube 8"/>
+          <p:cNvSpPr/>
+          <p:nvPr/>
+        </p:nvSpPr>
+        <p:spPr>
+          <a:xfrm>
+            <a:off x="1828800" y="4114800"/>
+            <a:ext cx="1066800" cy="685800"/>
+          </a:xfrm>
+          <a:prstGeom prst="cube">
+            <a:avLst/>
+          </a:prstGeom>
+        </p:spPr>
+        <p:style>
+          <a:lnRef idx="2">
+            <a:schemeClr val="accent6">
+              <a:shade val="50000"/>
+            </a:schemeClr>
+          </a:lnRef>
+          <a:fillRef idx="1">
+            <a:schemeClr val="accent6"/>
+          </a:fillRef>
+          <a:effectRef idx="0">
+            <a:schemeClr val="accent6"/>
+          </a:effectRef>
+          <a:fontRef idx="minor">
+            <a:schemeClr val="lt1"/>
+          </a:fontRef>
+        </p:style>
+        <p:txBody>
+          <a:bodyPr rtlCol="0" anchor="ctr"/>
+          <a:lstStyle/>
+          <a:p>
+            <a:pPr algn="ctr"/>
+            <a:r>
+              <a:rPr lang="en-US" dirty="0" smtClean="0">
+                <a:solidFill>
+                  <a:srgbClr val="000000"/>
+                </a:solidFill>
+              </a:rPr>
+              <a:t>Boost</a:t>
+            </a:r>
+            <a:endParaRPr lang="en-US" dirty="0">
+              <a:solidFill>
+                <a:srgbClr val="000000"/>
+              </a:solidFill>
+            </a:endParaRPr>
+          </a:p>
+        </p:txBody>
+      </p:sp>
+      <p:sp>
+        <p:nvSpPr>
+          <p:cNvPr id="21" name="Cube 20"/>
+          <p:cNvSpPr/>
+          <p:nvPr/>
+        </p:nvSpPr>
+        <p:spPr>
+          <a:xfrm>
+            <a:off x="2895600" y="4114800"/>
+            <a:ext cx="1219200" cy="685800"/>
+          </a:xfrm>
+          <a:prstGeom prst="cube">
+            <a:avLst/>
+          </a:prstGeom>
+        </p:spPr>
+        <p:style>
+          <a:lnRef idx="1">
+            <a:schemeClr val="accent3"/>
+          </a:lnRef>
+          <a:fillRef idx="3">
+            <a:schemeClr val="accent3"/>
+          </a:fillRef>
+          <a:effectRef idx="2">
+            <a:schemeClr val="accent3"/>
+          </a:effectRef>
+          <a:fontRef idx="minor">
+            <a:schemeClr val="lt1"/>
+          </a:fontRef>
+        </p:style>
+        <p:txBody>
+          <a:bodyPr rtlCol="0" anchor="ctr"/>
+          <a:lstStyle/>
+          <a:p>
+            <a:pPr algn="ctr"/>
+            <a:r>
+              <a:rPr lang="en-US" dirty="0" err="1" smtClean="0">
+                <a:solidFill>
+                  <a:srgbClr val="000000"/>
+                </a:solidFill>
+              </a:rPr>
+              <a:t>SQLite</a:t>
             </a:r>
             <a:endParaRPr lang="en-US" dirty="0">
               <a:solidFill>
@@ -3204,64 +3306,14 @@
       </p:sp>
       <p:sp>
         <p:nvSpPr>
-          <p:cNvPr id="9" name="Cube 8"/>
-          <p:cNvSpPr/>
-          <p:nvPr/>
-        </p:nvSpPr>
-        <p:spPr>
-          <a:xfrm>
-            <a:off x="2133600" y="4038600"/>
-            <a:ext cx="1371600" cy="685800"/>
-          </a:xfrm>
-          <a:prstGeom prst="cube">
-            <a:avLst/>
-          </a:prstGeom>
-        </p:spPr>
-        <p:style>
-          <a:lnRef idx="1">
-            <a:schemeClr val="accent3"/>
-          </a:lnRef>
-          <a:fillRef idx="3">
-            <a:schemeClr val="accent3"/>
-          </a:fillRef>
-          <a:effectRef idx="2">
-            <a:schemeClr val="accent3"/>
-          </a:effectRef>
-          <a:fontRef idx="minor">
-            <a:schemeClr val="lt1"/>
-          </a:fontRef>
-        </p:style>
-        <p:txBody>
-          <a:bodyPr rtlCol="0" anchor="ctr"/>
-          <a:lstStyle/>
-          <a:p>
-            <a:pPr algn="ctr"/>
-            <a:r>
-              <a:rPr lang="en-US" dirty="0" smtClean="0">
-                <a:solidFill>
-                  <a:srgbClr val="000000"/>
-                </a:solidFill>
-              </a:rPr>
-              <a:t>Boost</a:t>
-            </a:r>
-            <a:endParaRPr lang="en-US" dirty="0">
-              <a:solidFill>
-                <a:srgbClr val="000000"/>
-              </a:solidFill>
-            </a:endParaRPr>
-          </a:p>
-        </p:txBody>
-      </p:sp>
-      <p:sp>
-        <p:nvSpPr>
           <p:cNvPr id="8" name="Cube 7"/>
           <p:cNvSpPr/>
           <p:nvPr/>
         </p:nvSpPr>
         <p:spPr>
           <a:xfrm>
-            <a:off x="762000" y="3505200"/>
-            <a:ext cx="2743200" cy="685800"/>
+            <a:off x="533400" y="3505200"/>
+            <a:ext cx="3581400" cy="685800"/>
           </a:xfrm>
           <a:prstGeom prst="cube">
             <a:avLst/>
@@ -3404,8 +3456,8 @@
         </p:nvCxnSpPr>
         <p:spPr>
           <a:xfrm rot="10800000" flipV="1">
-            <a:off x="2219326" y="2714624"/>
-            <a:ext cx="1285875" cy="790575"/>
+            <a:off x="2409826" y="2714624"/>
+            <a:ext cx="1095375" cy="790575"/>
           </a:xfrm>
           <a:prstGeom prst="curvedConnector2">
             <a:avLst/>
@@ -3443,8 +3495,8 @@
         </p:nvCxnSpPr>
         <p:spPr>
           <a:xfrm>
-            <a:off x="3505200" y="3762375"/>
-            <a:ext cx="2362200" cy="552450"/>
+            <a:off x="4114800" y="3762375"/>
+            <a:ext cx="1752600" cy="552450"/>
           </a:xfrm>
           <a:prstGeom prst="curvedConnector3">
             <a:avLst>
@@ -3575,11 +3627,7 @@
             <a:p>
               <a:r>
                 <a:rPr lang="en-US" dirty="0" smtClean="0"/>
-                <a:t>a</a:t>
-              </a:r>
-              <a:r>
-                <a:rPr lang="en-US" dirty="0" smtClean="0"/>
-                <a:t>utomated</a:t>
+                <a:t>automated</a:t>
               </a:r>
             </a:p>
             <a:p>
@@ -3915,7 +3963,7 @@
         </p:nvSpPr>
         <p:spPr>
           <a:xfrm>
-            <a:off x="3505200" y="3352800"/>
+            <a:off x="3505200" y="3505200"/>
             <a:ext cx="2362199" cy="685800"/>
           </a:xfrm>
           <a:prstGeom prst="cube">
@@ -3965,7 +4013,7 @@
         </p:nvSpPr>
         <p:spPr>
           <a:xfrm>
-            <a:off x="3505199" y="2819400"/>
+            <a:off x="3505199" y="2895600"/>
             <a:ext cx="2362201" cy="685800"/>
           </a:xfrm>
           <a:prstGeom prst="cube">
@@ -4198,11 +4246,7 @@
             <a:p>
               <a:r>
                 <a:rPr lang="en-US" dirty="0" smtClean="0"/>
-                <a:t>a</a:t>
-              </a:r>
-              <a:r>
-                <a:rPr lang="en-US" dirty="0" smtClean="0"/>
-                <a:t>utomated</a:t>
+                <a:t>automated</a:t>
               </a:r>
             </a:p>
             <a:p>
@@ -4323,7 +4367,7 @@
         </p:nvSpPr>
         <p:spPr>
           <a:xfrm>
-            <a:off x="5867400" y="4419600"/>
+            <a:off x="5867400" y="4495800"/>
             <a:ext cx="1143000" cy="685800"/>
           </a:xfrm>
           <a:prstGeom prst="cube">
@@ -4373,8 +4417,8 @@
         </p:nvSpPr>
         <p:spPr>
           <a:xfrm>
-            <a:off x="7010400" y="4419600"/>
-            <a:ext cx="1219200" cy="685800"/>
+            <a:off x="7010400" y="4495800"/>
+            <a:ext cx="1447800" cy="685800"/>
           </a:xfrm>
           <a:prstGeom prst="cube">
             <a:avLst/>
@@ -4400,12 +4444,12 @@
           <a:p>
             <a:pPr algn="ctr"/>
             <a:r>
-              <a:rPr lang="en-US" dirty="0" smtClean="0">
+              <a:rPr lang="en-US" dirty="0" err="1" smtClean="0">
                 <a:solidFill>
                   <a:srgbClr val="000000"/>
                 </a:solidFill>
               </a:rPr>
-              <a:t>SQLite</a:t>
+              <a:t>SQLite.NET</a:t>
             </a:r>
             <a:endParaRPr lang="en-US" dirty="0">
               <a:solidFill>
@@ -4680,8 +4724,8 @@
         </p:nvCxnSpPr>
         <p:spPr>
           <a:xfrm rot="16200000" flipV="1">
-            <a:off x="5829301" y="2581275"/>
-            <a:ext cx="1343025" cy="1266825"/>
+            <a:off x="5886451" y="2524125"/>
+            <a:ext cx="1343025" cy="1381125"/>
           </a:xfrm>
           <a:prstGeom prst="curvedConnector2">
             <a:avLst/>
@@ -4720,7 +4764,7 @@
         <p:spPr>
           <a:xfrm>
             <a:off x="5867400" y="3886200"/>
-            <a:ext cx="2362200" cy="685800"/>
+            <a:ext cx="2590800" cy="685800"/>
           </a:xfrm>
           <a:prstGeom prst="cube">
             <a:avLst/>
@@ -4821,11 +4865,7 @@
             <a:p>
               <a:r>
                 <a:rPr lang="en-US" dirty="0" smtClean="0"/>
-                <a:t>a</a:t>
-              </a:r>
-              <a:r>
-                <a:rPr lang="en-US" dirty="0" smtClean="0"/>
-                <a:t>utomated</a:t>
+                <a:t>automated</a:t>
               </a:r>
             </a:p>
             <a:p>

</xml_diff>

<commit_message>
Thu Dec 31 07:19:54 UTC 2009  James H. Hill  <hillj@dre.vanderbilt.edu>
git-svn-id: https://svn.cs.iupui.edu/repos/CUTS/trunk@2941 9fe22f9e-a3cf-4311-a215-5c011952144b
</commit_message>
<xml_diff>
--- a/CUTS/docs/manual/other/drawing-palette.pptx
+++ b/CUTS/docs/manual/other/drawing-palette.pptx
@@ -291,7 +291,7 @@
             <a:fld id="{B9524C96-D734-AD47-A187-46EFE930DBD0}" type="datetimeFigureOut">
               <a:rPr lang="en-US" smtClean="0"/>
               <a:pPr/>
-              <a:t>1/30/09</a:t>
+              <a:t>12/31/09</a:t>
             </a:fld>
             <a:endParaRPr lang="en-US"/>
           </a:p>
@@ -458,7 +458,7 @@
             <a:fld id="{B9524C96-D734-AD47-A187-46EFE930DBD0}" type="datetimeFigureOut">
               <a:rPr lang="en-US" smtClean="0"/>
               <a:pPr/>
-              <a:t>1/30/09</a:t>
+              <a:t>12/31/09</a:t>
             </a:fld>
             <a:endParaRPr lang="en-US"/>
           </a:p>
@@ -635,7 +635,7 @@
             <a:fld id="{B9524C96-D734-AD47-A187-46EFE930DBD0}" type="datetimeFigureOut">
               <a:rPr lang="en-US" smtClean="0"/>
               <a:pPr/>
-              <a:t>1/30/09</a:t>
+              <a:t>12/31/09</a:t>
             </a:fld>
             <a:endParaRPr lang="en-US"/>
           </a:p>
@@ -802,7 +802,7 @@
             <a:fld id="{B9524C96-D734-AD47-A187-46EFE930DBD0}" type="datetimeFigureOut">
               <a:rPr lang="en-US" smtClean="0"/>
               <a:pPr/>
-              <a:t>1/30/09</a:t>
+              <a:t>12/31/09</a:t>
             </a:fld>
             <a:endParaRPr lang="en-US"/>
           </a:p>
@@ -1045,7 +1045,7 @@
             <a:fld id="{B9524C96-D734-AD47-A187-46EFE930DBD0}" type="datetimeFigureOut">
               <a:rPr lang="en-US" smtClean="0"/>
               <a:pPr/>
-              <a:t>1/30/09</a:t>
+              <a:t>12/31/09</a:t>
             </a:fld>
             <a:endParaRPr lang="en-US"/>
           </a:p>
@@ -1330,7 +1330,7 @@
             <a:fld id="{B9524C96-D734-AD47-A187-46EFE930DBD0}" type="datetimeFigureOut">
               <a:rPr lang="en-US" smtClean="0"/>
               <a:pPr/>
-              <a:t>1/30/09</a:t>
+              <a:t>12/31/09</a:t>
             </a:fld>
             <a:endParaRPr lang="en-US"/>
           </a:p>
@@ -1749,7 +1749,7 @@
             <a:fld id="{B9524C96-D734-AD47-A187-46EFE930DBD0}" type="datetimeFigureOut">
               <a:rPr lang="en-US" smtClean="0"/>
               <a:pPr/>
-              <a:t>1/30/09</a:t>
+              <a:t>12/31/09</a:t>
             </a:fld>
             <a:endParaRPr lang="en-US"/>
           </a:p>
@@ -1864,7 +1864,7 @@
             <a:fld id="{B9524C96-D734-AD47-A187-46EFE930DBD0}" type="datetimeFigureOut">
               <a:rPr lang="en-US" smtClean="0"/>
               <a:pPr/>
-              <a:t>1/30/09</a:t>
+              <a:t>12/31/09</a:t>
             </a:fld>
             <a:endParaRPr lang="en-US"/>
           </a:p>
@@ -1956,7 +1956,7 @@
             <a:fld id="{B9524C96-D734-AD47-A187-46EFE930DBD0}" type="datetimeFigureOut">
               <a:rPr lang="en-US" smtClean="0"/>
               <a:pPr/>
-              <a:t>1/30/09</a:t>
+              <a:t>12/31/09</a:t>
             </a:fld>
             <a:endParaRPr lang="en-US"/>
           </a:p>
@@ -2230,7 +2230,7 @@
             <a:fld id="{B9524C96-D734-AD47-A187-46EFE930DBD0}" type="datetimeFigureOut">
               <a:rPr lang="en-US" smtClean="0"/>
               <a:pPr/>
-              <a:t>1/30/09</a:t>
+              <a:t>12/31/09</a:t>
             </a:fld>
             <a:endParaRPr lang="en-US"/>
           </a:p>
@@ -2480,7 +2480,7 @@
             <a:fld id="{B9524C96-D734-AD47-A187-46EFE930DBD0}" type="datetimeFigureOut">
               <a:rPr lang="en-US" smtClean="0"/>
               <a:pPr/>
-              <a:t>1/30/09</a:t>
+              <a:t>12/31/09</a:t>
             </a:fld>
             <a:endParaRPr lang="en-US"/>
           </a:p>
@@ -2690,7 +2690,7 @@
             <a:fld id="{B9524C96-D734-AD47-A187-46EFE930DBD0}" type="datetimeFigureOut">
               <a:rPr lang="en-US" smtClean="0"/>
               <a:pPr/>
-              <a:t>1/30/09</a:t>
+              <a:t>12/31/09</a:t>
             </a:fld>
             <a:endParaRPr lang="en-US"/>
           </a:p>
@@ -3101,7 +3101,7 @@
                   <a:srgbClr val="000000"/>
                 </a:solidFill>
               </a:rPr>
-              <a:t>ACE + TAO</a:t>
+              <a:t>DOC</a:t>
             </a:r>
             <a:endParaRPr lang="en-US" dirty="0">
               <a:solidFill>

</xml_diff>

<commit_message>
Mon Jan 18 23:48:13 UTC 2010  James H. Hill  <hillj at cs dot iupui dot edu>
git-svn-id: https://svn.cs.iupui.edu/repos/CUTS/trunk@2946 9fe22f9e-a3cf-4311-a215-5c011952144b
</commit_message>
<xml_diff>
--- a/CUTS/docs/manual/other/drawing-palette.pptx
+++ b/CUTS/docs/manual/other/drawing-palette.pptx
@@ -291,7 +291,7 @@
             <a:fld id="{B9524C96-D734-AD47-A187-46EFE930DBD0}" type="datetimeFigureOut">
               <a:rPr lang="en-US" smtClean="0"/>
               <a:pPr/>
-              <a:t>12/31/09</a:t>
+              <a:t>1/18/10</a:t>
             </a:fld>
             <a:endParaRPr lang="en-US"/>
           </a:p>
@@ -458,7 +458,7 @@
             <a:fld id="{B9524C96-D734-AD47-A187-46EFE930DBD0}" type="datetimeFigureOut">
               <a:rPr lang="en-US" smtClean="0"/>
               <a:pPr/>
-              <a:t>12/31/09</a:t>
+              <a:t>1/18/10</a:t>
             </a:fld>
             <a:endParaRPr lang="en-US"/>
           </a:p>
@@ -635,7 +635,7 @@
             <a:fld id="{B9524C96-D734-AD47-A187-46EFE930DBD0}" type="datetimeFigureOut">
               <a:rPr lang="en-US" smtClean="0"/>
               <a:pPr/>
-              <a:t>12/31/09</a:t>
+              <a:t>1/18/10</a:t>
             </a:fld>
             <a:endParaRPr lang="en-US"/>
           </a:p>
@@ -802,7 +802,7 @@
             <a:fld id="{B9524C96-D734-AD47-A187-46EFE930DBD0}" type="datetimeFigureOut">
               <a:rPr lang="en-US" smtClean="0"/>
               <a:pPr/>
-              <a:t>12/31/09</a:t>
+              <a:t>1/18/10</a:t>
             </a:fld>
             <a:endParaRPr lang="en-US"/>
           </a:p>
@@ -1045,7 +1045,7 @@
             <a:fld id="{B9524C96-D734-AD47-A187-46EFE930DBD0}" type="datetimeFigureOut">
               <a:rPr lang="en-US" smtClean="0"/>
               <a:pPr/>
-              <a:t>12/31/09</a:t>
+              <a:t>1/18/10</a:t>
             </a:fld>
             <a:endParaRPr lang="en-US"/>
           </a:p>
@@ -1330,7 +1330,7 @@
             <a:fld id="{B9524C96-D734-AD47-A187-46EFE930DBD0}" type="datetimeFigureOut">
               <a:rPr lang="en-US" smtClean="0"/>
               <a:pPr/>
-              <a:t>12/31/09</a:t>
+              <a:t>1/18/10</a:t>
             </a:fld>
             <a:endParaRPr lang="en-US"/>
           </a:p>
@@ -1749,7 +1749,7 @@
             <a:fld id="{B9524C96-D734-AD47-A187-46EFE930DBD0}" type="datetimeFigureOut">
               <a:rPr lang="en-US" smtClean="0"/>
               <a:pPr/>
-              <a:t>12/31/09</a:t>
+              <a:t>1/18/10</a:t>
             </a:fld>
             <a:endParaRPr lang="en-US"/>
           </a:p>
@@ -1864,7 +1864,7 @@
             <a:fld id="{B9524C96-D734-AD47-A187-46EFE930DBD0}" type="datetimeFigureOut">
               <a:rPr lang="en-US" smtClean="0"/>
               <a:pPr/>
-              <a:t>12/31/09</a:t>
+              <a:t>1/18/10</a:t>
             </a:fld>
             <a:endParaRPr lang="en-US"/>
           </a:p>
@@ -1956,7 +1956,7 @@
             <a:fld id="{B9524C96-D734-AD47-A187-46EFE930DBD0}" type="datetimeFigureOut">
               <a:rPr lang="en-US" smtClean="0"/>
               <a:pPr/>
-              <a:t>12/31/09</a:t>
+              <a:t>1/18/10</a:t>
             </a:fld>
             <a:endParaRPr lang="en-US"/>
           </a:p>
@@ -2230,7 +2230,7 @@
             <a:fld id="{B9524C96-D734-AD47-A187-46EFE930DBD0}" type="datetimeFigureOut">
               <a:rPr lang="en-US" smtClean="0"/>
               <a:pPr/>
-              <a:t>12/31/09</a:t>
+              <a:t>1/18/10</a:t>
             </a:fld>
             <a:endParaRPr lang="en-US"/>
           </a:p>
@@ -2480,7 +2480,7 @@
             <a:fld id="{B9524C96-D734-AD47-A187-46EFE930DBD0}" type="datetimeFigureOut">
               <a:rPr lang="en-US" smtClean="0"/>
               <a:pPr/>
-              <a:t>12/31/09</a:t>
+              <a:t>1/18/10</a:t>
             </a:fld>
             <a:endParaRPr lang="en-US"/>
           </a:p>
@@ -2690,7 +2690,7 @@
             <a:fld id="{B9524C96-D734-AD47-A187-46EFE930DBD0}" type="datetimeFigureOut">
               <a:rPr lang="en-US" smtClean="0"/>
               <a:pPr/>
-              <a:t>12/31/09</a:t>
+              <a:t>1/18/10</a:t>
             </a:fld>
             <a:endParaRPr lang="en-US"/>
           </a:p>
@@ -4361,106 +4361,6 @@
       </p:grpSpPr>
       <p:sp>
         <p:nvSpPr>
-          <p:cNvPr id="5" name="Cube 4"/>
-          <p:cNvSpPr/>
-          <p:nvPr/>
-        </p:nvSpPr>
-        <p:spPr>
-          <a:xfrm>
-            <a:off x="5867400" y="4495800"/>
-            <a:ext cx="1143000" cy="685800"/>
-          </a:xfrm>
-          <a:prstGeom prst="cube">
-            <a:avLst/>
-          </a:prstGeom>
-        </p:spPr>
-        <p:style>
-          <a:lnRef idx="1">
-            <a:schemeClr val="accent2"/>
-          </a:lnRef>
-          <a:fillRef idx="3">
-            <a:schemeClr val="accent2"/>
-          </a:fillRef>
-          <a:effectRef idx="2">
-            <a:schemeClr val="accent2"/>
-          </a:effectRef>
-          <a:fontRef idx="minor">
-            <a:schemeClr val="lt1"/>
-          </a:fontRef>
-        </p:style>
-        <p:txBody>
-          <a:bodyPr rtlCol="0" anchor="ctr"/>
-          <a:lstStyle/>
-          <a:p>
-            <a:pPr algn="ctr"/>
-            <a:r>
-              <a:rPr lang="en-US" dirty="0" smtClean="0">
-                <a:solidFill>
-                  <a:srgbClr val="000000"/>
-                </a:solidFill>
-              </a:rPr>
-              <a:t>ASP.NET</a:t>
-            </a:r>
-            <a:endParaRPr lang="en-US" dirty="0">
-              <a:solidFill>
-                <a:srgbClr val="000000"/>
-              </a:solidFill>
-            </a:endParaRPr>
-          </a:p>
-        </p:txBody>
-      </p:sp>
-      <p:sp>
-        <p:nvSpPr>
-          <p:cNvPr id="9" name="Cube 8"/>
-          <p:cNvSpPr/>
-          <p:nvPr/>
-        </p:nvSpPr>
-        <p:spPr>
-          <a:xfrm>
-            <a:off x="7010400" y="4495800"/>
-            <a:ext cx="1447800" cy="685800"/>
-          </a:xfrm>
-          <a:prstGeom prst="cube">
-            <a:avLst/>
-          </a:prstGeom>
-        </p:spPr>
-        <p:style>
-          <a:lnRef idx="1">
-            <a:schemeClr val="accent3"/>
-          </a:lnRef>
-          <a:fillRef idx="3">
-            <a:schemeClr val="accent3"/>
-          </a:fillRef>
-          <a:effectRef idx="2">
-            <a:schemeClr val="accent3"/>
-          </a:effectRef>
-          <a:fontRef idx="minor">
-            <a:schemeClr val="lt1"/>
-          </a:fontRef>
-        </p:style>
-        <p:txBody>
-          <a:bodyPr rtlCol="0" anchor="ctr"/>
-          <a:lstStyle/>
-          <a:p>
-            <a:pPr algn="ctr"/>
-            <a:r>
-              <a:rPr lang="en-US" dirty="0" err="1" smtClean="0">
-                <a:solidFill>
-                  <a:srgbClr val="000000"/>
-                </a:solidFill>
-              </a:rPr>
-              <a:t>SQLite.NET</a:t>
-            </a:r>
-            <a:endParaRPr lang="en-US" dirty="0">
-              <a:solidFill>
-                <a:srgbClr val="000000"/>
-              </a:solidFill>
-            </a:endParaRPr>
-          </a:p>
-        </p:txBody>
-      </p:sp>
-      <p:sp>
-        <p:nvSpPr>
           <p:cNvPr id="8" name="Cube 7"/>
           <p:cNvSpPr/>
           <p:nvPr/>
@@ -4684,7 +4584,7 @@
         <p:spPr>
           <a:xfrm>
             <a:off x="3505200" y="3762375"/>
-            <a:ext cx="2362200" cy="552450"/>
+            <a:ext cx="1676400" cy="552450"/>
           </a:xfrm>
           <a:prstGeom prst="curvedConnector3">
             <a:avLst>
@@ -4724,8 +4624,8 @@
         </p:nvCxnSpPr>
         <p:spPr>
           <a:xfrm rot="16200000" flipV="1">
-            <a:off x="5886451" y="2524125"/>
-            <a:ext cx="1343025" cy="1381125"/>
+            <a:off x="5791201" y="2619375"/>
+            <a:ext cx="1343025" cy="1190625"/>
           </a:xfrm>
           <a:prstGeom prst="curvedConnector2">
             <a:avLst/>
@@ -4755,56 +4655,6 @@
           </a:fontRef>
         </p:style>
       </p:cxnSp>
-      <p:sp>
-        <p:nvSpPr>
-          <p:cNvPr id="7" name="Cube 6"/>
-          <p:cNvSpPr/>
-          <p:nvPr/>
-        </p:nvSpPr>
-        <p:spPr>
-          <a:xfrm>
-            <a:off x="5867400" y="3886200"/>
-            <a:ext cx="2590800" cy="685800"/>
-          </a:xfrm>
-          <a:prstGeom prst="cube">
-            <a:avLst/>
-          </a:prstGeom>
-        </p:spPr>
-        <p:style>
-          <a:lnRef idx="1">
-            <a:schemeClr val="accent1"/>
-          </a:lnRef>
-          <a:fillRef idx="3">
-            <a:schemeClr val="accent1"/>
-          </a:fillRef>
-          <a:effectRef idx="2">
-            <a:schemeClr val="accent1"/>
-          </a:effectRef>
-          <a:fontRef idx="minor">
-            <a:schemeClr val="lt1"/>
-          </a:fontRef>
-        </p:style>
-        <p:txBody>
-          <a:bodyPr rtlCol="0" anchor="ctr"/>
-          <a:lstStyle/>
-          <a:p>
-            <a:pPr algn="ctr"/>
-            <a:r>
-              <a:rPr lang="en-US" dirty="0" smtClean="0">
-                <a:solidFill>
-                  <a:srgbClr val="000000"/>
-                </a:solidFill>
-              </a:rPr>
-              <a:t>CUTS Analysis</a:t>
-            </a:r>
-            <a:endParaRPr lang="en-US" dirty="0">
-              <a:solidFill>
-                <a:srgbClr val="000000"/>
-              </a:solidFill>
-            </a:endParaRPr>
-          </a:p>
-        </p:txBody>
-      </p:sp>
       <p:grpSp>
         <p:nvGrpSpPr>
           <p:cNvPr id="13" name="Group 12"/>
@@ -4953,6 +4803,208 @@
           </p:style>
         </p:cxnSp>
       </p:grpSp>
+      <p:sp>
+        <p:nvSpPr>
+          <p:cNvPr id="19" name="Cube 18"/>
+          <p:cNvSpPr/>
+          <p:nvPr/>
+        </p:nvSpPr>
+        <p:spPr>
+          <a:xfrm>
+            <a:off x="5181600" y="4495800"/>
+            <a:ext cx="1371600" cy="685800"/>
+          </a:xfrm>
+          <a:prstGeom prst="cube">
+            <a:avLst/>
+          </a:prstGeom>
+        </p:spPr>
+        <p:style>
+          <a:lnRef idx="1">
+            <a:schemeClr val="accent2"/>
+          </a:lnRef>
+          <a:fillRef idx="3">
+            <a:schemeClr val="accent2"/>
+          </a:fillRef>
+          <a:effectRef idx="2">
+            <a:schemeClr val="accent2"/>
+          </a:effectRef>
+          <a:fontRef idx="minor">
+            <a:schemeClr val="lt1"/>
+          </a:fontRef>
+        </p:style>
+        <p:txBody>
+          <a:bodyPr rtlCol="0" anchor="ctr"/>
+          <a:lstStyle/>
+          <a:p>
+            <a:pPr algn="ctr"/>
+            <a:r>
+              <a:rPr lang="en-US" dirty="0" smtClean="0">
+                <a:solidFill>
+                  <a:srgbClr val="000000"/>
+                </a:solidFill>
+              </a:rPr>
+              <a:t>DOC</a:t>
+            </a:r>
+            <a:endParaRPr lang="en-US" dirty="0">
+              <a:solidFill>
+                <a:srgbClr val="000000"/>
+              </a:solidFill>
+            </a:endParaRPr>
+          </a:p>
+        </p:txBody>
+      </p:sp>
+      <p:sp>
+        <p:nvSpPr>
+          <p:cNvPr id="20" name="Cube 19"/>
+          <p:cNvSpPr/>
+          <p:nvPr/>
+        </p:nvSpPr>
+        <p:spPr>
+          <a:xfrm>
+            <a:off x="6477000" y="4495800"/>
+            <a:ext cx="1066800" cy="685800"/>
+          </a:xfrm>
+          <a:prstGeom prst="cube">
+            <a:avLst/>
+          </a:prstGeom>
+        </p:spPr>
+        <p:style>
+          <a:lnRef idx="2">
+            <a:schemeClr val="accent6">
+              <a:shade val="50000"/>
+            </a:schemeClr>
+          </a:lnRef>
+          <a:fillRef idx="1">
+            <a:schemeClr val="accent6"/>
+          </a:fillRef>
+          <a:effectRef idx="0">
+            <a:schemeClr val="accent6"/>
+          </a:effectRef>
+          <a:fontRef idx="minor">
+            <a:schemeClr val="lt1"/>
+          </a:fontRef>
+        </p:style>
+        <p:txBody>
+          <a:bodyPr rtlCol="0" anchor="ctr"/>
+          <a:lstStyle/>
+          <a:p>
+            <a:pPr algn="ctr"/>
+            <a:r>
+              <a:rPr lang="en-US" dirty="0" smtClean="0">
+                <a:solidFill>
+                  <a:srgbClr val="000000"/>
+                </a:solidFill>
+              </a:rPr>
+              <a:t>Boost</a:t>
+            </a:r>
+            <a:endParaRPr lang="en-US" dirty="0">
+              <a:solidFill>
+                <a:srgbClr val="000000"/>
+              </a:solidFill>
+            </a:endParaRPr>
+          </a:p>
+        </p:txBody>
+      </p:sp>
+      <p:sp>
+        <p:nvSpPr>
+          <p:cNvPr id="21" name="Cube 20"/>
+          <p:cNvSpPr/>
+          <p:nvPr/>
+        </p:nvSpPr>
+        <p:spPr>
+          <a:xfrm>
+            <a:off x="7543800" y="4495800"/>
+            <a:ext cx="1219200" cy="685800"/>
+          </a:xfrm>
+          <a:prstGeom prst="cube">
+            <a:avLst/>
+          </a:prstGeom>
+        </p:spPr>
+        <p:style>
+          <a:lnRef idx="1">
+            <a:schemeClr val="accent3"/>
+          </a:lnRef>
+          <a:fillRef idx="3">
+            <a:schemeClr val="accent3"/>
+          </a:fillRef>
+          <a:effectRef idx="2">
+            <a:schemeClr val="accent3"/>
+          </a:effectRef>
+          <a:fontRef idx="minor">
+            <a:schemeClr val="lt1"/>
+          </a:fontRef>
+        </p:style>
+        <p:txBody>
+          <a:bodyPr rtlCol="0" anchor="ctr"/>
+          <a:lstStyle/>
+          <a:p>
+            <a:pPr algn="ctr"/>
+            <a:r>
+              <a:rPr lang="en-US" dirty="0" err="1" smtClean="0">
+                <a:solidFill>
+                  <a:srgbClr val="000000"/>
+                </a:solidFill>
+              </a:rPr>
+              <a:t>SQLite</a:t>
+            </a:r>
+            <a:endParaRPr lang="en-US" dirty="0">
+              <a:solidFill>
+                <a:srgbClr val="000000"/>
+              </a:solidFill>
+            </a:endParaRPr>
+          </a:p>
+        </p:txBody>
+      </p:sp>
+      <p:sp>
+        <p:nvSpPr>
+          <p:cNvPr id="7" name="Cube 6"/>
+          <p:cNvSpPr/>
+          <p:nvPr/>
+        </p:nvSpPr>
+        <p:spPr>
+          <a:xfrm>
+            <a:off x="5181600" y="3886200"/>
+            <a:ext cx="3581400" cy="685800"/>
+          </a:xfrm>
+          <a:prstGeom prst="cube">
+            <a:avLst/>
+          </a:prstGeom>
+        </p:spPr>
+        <p:style>
+          <a:lnRef idx="1">
+            <a:schemeClr val="accent1"/>
+          </a:lnRef>
+          <a:fillRef idx="3">
+            <a:schemeClr val="accent1"/>
+          </a:fillRef>
+          <a:effectRef idx="2">
+            <a:schemeClr val="accent1"/>
+          </a:effectRef>
+          <a:fontRef idx="minor">
+            <a:schemeClr val="lt1"/>
+          </a:fontRef>
+        </p:style>
+        <p:txBody>
+          <a:bodyPr rtlCol="0" anchor="ctr"/>
+          <a:lstStyle/>
+          <a:p>
+            <a:pPr algn="ctr"/>
+            <a:r>
+              <a:rPr lang="en-US" dirty="0" smtClean="0">
+                <a:solidFill>
+                  <a:srgbClr val="000000"/>
+                </a:solidFill>
+              </a:rPr>
+              <a:t>CUTS Analysis</a:t>
+            </a:r>
+            <a:endParaRPr lang="en-US" dirty="0">
+              <a:solidFill>
+                <a:srgbClr val="000000"/>
+              </a:solidFill>
+            </a:endParaRPr>
+          </a:p>
+        </p:txBody>
+      </p:sp>
     </p:spTree>
   </p:cSld>
   <p:clrMapOvr>

</xml_diff>